<commit_message>
added Species Accumulation Curves, color-blind friendly pallets
</commit_message>
<xml_diff>
--- a/writing/OBAposter.eas_RMA.pptx
+++ b/writing/OBAposter.eas_RMA.pptx
@@ -411,6 +411,20 @@
       <pc:sldMk xmlns:pc="http://schemas.microsoft.com/office/powerpoint/2013/main/command" cId="4291909901" sldId="258"/>
       <ac:spMk id="50" creationId="{F127BD46-C60E-CDE8-A2E9-170E6CF8D1A4}"/>
     </ac:deMkLst>
+    <p188:replyLst>
+      <p188:reply id="{F7C75661-DDDE-4EE1-8B1A-877402D8A8C4}" authorId="{60A61525-B829-576C-5A9E-22FE6FC89C63}" created="2024-09-09T18:22:30.828">
+        <p188:txBody>
+          <a:bodyPr/>
+          <a:lstStyle/>
+          <a:p>
+            <a:r>
+              <a:rPr lang="en-US"/>
+              <a:t>Looks good, I made a few changes.</a:t>
+            </a:r>
+          </a:p>
+        </p188:txBody>
+      </p188:reply>
+    </p188:replyLst>
     <p188:txBody>
       <a:bodyPr/>
       <a:lstStyle/>
@@ -445,6 +459,20 @@
       <pc:sldMk xmlns:pc="http://schemas.microsoft.com/office/powerpoint/2013/main/command" cId="4291909901" sldId="258"/>
       <ac:graphicFrameMk id="63" creationId="{978ABAFD-6021-A7C6-C6D9-1E5285D0D0DD}"/>
     </ac:deMkLst>
+    <p188:replyLst>
+      <p188:reply id="{B7E65DC3-CB0B-48ED-953A-8CA8FD2DE93A}" authorId="{60A61525-B829-576C-5A9E-22FE6FC89C63}" created="2024-09-09T18:22:10.512">
+        <p188:txBody>
+          <a:bodyPr/>
+          <a:lstStyle/>
+          <a:p>
+            <a:r>
+              <a:rPr lang="en-US"/>
+              <a:t>I'll make a cleaner version of this once we've settled on the info we want. Also, this conference should really be used to find out what others are interested in with this dataset. What haven't we shown? This should help refine the manuscript direction too.</a:t>
+            </a:r>
+          </a:p>
+        </p188:txBody>
+      </p188:reply>
+    </p188:replyLst>
     <p188:txBody>
       <a:bodyPr/>
       <a:lstStyle/>
@@ -526,6 +554,18 @@
           </a:p>
         </p188:txBody>
       </p188:reply>
+      <p188:reply id="{EF4CC5E5-4741-412F-B608-57F62295C9FF}" authorId="{60A61525-B829-576C-5A9E-22FE6FC89C63}" created="2024-09-09T18:13:50.711">
+        <p188:txBody>
+          <a:bodyPr/>
+          <a:lstStyle/>
+          <a:p>
+            <a:r>
+              <a:rPr lang="en-US"/>
+              <a:t>We don't need references in posters. They take up too much space and this is not the place to cite them, we'll save that for the manuscript.</a:t>
+            </a:r>
+          </a:p>
+        </p188:txBody>
+      </p188:reply>
     </p188:replyLst>
     <p188:txBody>
       <a:bodyPr/>
@@ -544,6 +584,20 @@
       <pc:sldMk xmlns:pc="http://schemas.microsoft.com/office/powerpoint/2013/main/command" cId="4291909901" sldId="258"/>
       <ac:picMk id="53" creationId="{271DEAC4-F778-DC6A-10B4-D39703BEE8A0}"/>
     </ac:deMkLst>
+    <p188:replyLst>
+      <p188:reply id="{B0424B6C-FE6A-4455-91EB-845CA2EBC001}" authorId="{60A61525-B829-576C-5A9E-22FE6FC89C63}" created="2024-09-09T18:18:41.697">
+        <p188:txBody>
+          <a:bodyPr/>
+          <a:lstStyle/>
+          <a:p>
+            <a:r>
+              <a:rPr lang="en-US"/>
+              <a:t>Posters shouldn't have figure numbers, instead I've added descriptions of each figure. The poster should read linearly, without having to back and forth reference figures, therefore no need for numbers.</a:t>
+            </a:r>
+          </a:p>
+        </p188:txBody>
+      </p188:reply>
+    </p188:replyLst>
     <p188:txBody>
       <a:bodyPr/>
       <a:lstStyle/>
@@ -585,6 +639,27 @@
         <a:r>
           <a:rPr lang="en-US"/>
           <a:t>Standardizing the caption left some space below the actual graphic. One way to fill this up is to make the caption square and use another bee photo to fill the leftover area.</a:t>
+        </a:r>
+      </a:p>
+    </p188:txBody>
+  </p188:cm>
+  <p188:cm id="{7034D51B-A642-49F8-82D6-B85294005BC7}" authorId="{60A61525-B829-576C-5A9E-22FE6FC89C63}" created="2024-09-09T18:19:56.999">
+    <ac:txMkLst xmlns:ac="http://schemas.microsoft.com/office/drawing/2013/main/command">
+      <pc:docMk xmlns:pc="http://schemas.microsoft.com/office/powerpoint/2013/main/command"/>
+      <pc:sldMk xmlns:pc="http://schemas.microsoft.com/office/powerpoint/2013/main/command" cId="4291909901" sldId="258"/>
+      <ac:spMk id="55" creationId="{B2522E23-9396-3ABF-B4F0-45050221018D}"/>
+      <ac:txMk cp="0" len="36">
+        <ac:context len="38" hash="1462945591"/>
+      </ac:txMk>
+    </ac:txMkLst>
+    <p188:pos x="4599511" y="838383"/>
+    <p188:txBody>
+      <a:bodyPr/>
+      <a:lstStyle/>
+      <a:p>
+        <a:r>
+          <a:rPr lang="en-US"/>
+          <a:t>I'm leaving room here for a larger table/ description of the findings, but we'll probably have room for a nice bee photo in the middle of this column.</a:t>
         </a:r>
       </a:p>
     </p188:txBody>
@@ -3468,8 +3543,8 @@
         </p:nvSpPr>
         <p:spPr>
           <a:xfrm>
-            <a:off x="481263" y="-4518977"/>
-            <a:ext cx="42928673" cy="38138334"/>
+            <a:off x="481263" y="338667"/>
+            <a:ext cx="42928673" cy="32308800"/>
           </a:xfrm>
           <a:prstGeom prst="rect">
             <a:avLst/>
@@ -3849,7 +3924,7 @@
         <p:spPr>
           <a:xfrm>
             <a:off x="1899965" y="6834455"/>
-            <a:ext cx="7228451" cy="7848302"/>
+            <a:ext cx="7228451" cy="8217634"/>
           </a:xfrm>
           <a:prstGeom prst="rect">
             <a:avLst/>
@@ -3872,7 +3947,23 @@
                 <a:ea typeface="Aptos" panose="020B0004020202020204" pitchFamily="34" charset="0"/>
                 <a:cs typeface="Times New Roman" panose="02020603050405020304" pitchFamily="18" charset="0"/>
               </a:rPr>
-              <a:t>The maritime Puget Sound zone west of the Cascade Range is known for relatively low insect diversity in many taxonomic groups compared with other areas in North America. Yet the bee fauna has remained largely undescribed and unsampled. Recent research, including this study, has provided the foundation for a more complete analysis. The newly conceived and implemented Washington Bee Atlas project is assembling what data have been assembled over the past few years, sponsoring more focused sampling, and is supplementing this with specimen collections curated by Washington State University. As a contribution to the scientific understanding of the bees of the region, we collected bees for 7 years on marginal lowlands of the Puget Sound area as part of a revegetation monitoring effort that began in 2014, sponsored by The Common Acre. Here, we present a description of the bee species we found and the communities of comprised of them.</a:t>
+              <a:t>The maritime Puget Sound zone west of the Cascade Range is known for relatively low insect diversity in many taxonomic groups compared with other areas in North America. Whether this pattern holds for bee fauna as well remains untested as this group is largely undescribed and unsampled. Recent research, including this study, has provided the foundation for a more complete analysis. The newly conceived and implemented </a:t>
+            </a:r>
+            <a:r>
+              <a:rPr lang="en-US" sz="2400" i="1" kern="100" dirty="0">
+                <a:latin typeface="Aptos" panose="020B0004020202020204" pitchFamily="34" charset="0"/>
+                <a:ea typeface="Aptos" panose="020B0004020202020204" pitchFamily="34" charset="0"/>
+                <a:cs typeface="Times New Roman" panose="02020603050405020304" pitchFamily="18" charset="0"/>
+              </a:rPr>
+              <a:t>Washington Bee Atlas </a:t>
+            </a:r>
+            <a:r>
+              <a:rPr lang="en-US" sz="2400" kern="100" dirty="0">
+                <a:latin typeface="Aptos" panose="020B0004020202020204" pitchFamily="34" charset="0"/>
+                <a:ea typeface="Aptos" panose="020B0004020202020204" pitchFamily="34" charset="0"/>
+                <a:cs typeface="Times New Roman" panose="02020603050405020304" pitchFamily="18" charset="0"/>
+              </a:rPr>
+              <a:t>project is assembling the data collected over the past few years, sponsoring more focused sampling, and supplementing this data with specimen collections curated by Washington State University. As a contribution to the scientific understanding of the bees of the region, we collected bees for 7 years on marginal lowlands of the Puget Sound area as part of a revegetation monitoring effort that began in 2014, sponsored by The Common Acre. Here, we present a description of the bee species we found and the communities they shape.</a:t>
             </a:r>
           </a:p>
           <a:p>
@@ -6163,7 +6254,7 @@
         </p:blipFill>
         <p:spPr>
           <a:xfrm>
-            <a:off x="10548314" y="13863896"/>
+            <a:off x="10488909" y="14170716"/>
             <a:ext cx="9720255" cy="5970818"/>
           </a:xfrm>
           <a:prstGeom prst="rect">
@@ -6178,10 +6269,10 @@
       </p:pic>
       <p:pic>
         <p:nvPicPr>
-          <p:cNvPr id="53" name="Picture 52" descr="A graph with different colored lines&#10;&#10;Description automatically generated">
-            <a:extLst>
-              <a:ext uri="{FF2B5EF4-FFF2-40B4-BE49-F238E27FC236}">
-                <a16:creationId xmlns:a16="http://schemas.microsoft.com/office/drawing/2014/main" id="{271DEAC4-F778-DC6A-10B4-D39703BEE8A0}"/>
+          <p:cNvPr id="54" name="Picture 53" descr="A diagram of a variety of species&#10;&#10;Description automatically generated with medium confidence">
+            <a:extLst>
+              <a:ext uri="{FF2B5EF4-FFF2-40B4-BE49-F238E27FC236}">
+                <a16:creationId xmlns:a16="http://schemas.microsoft.com/office/drawing/2014/main" id="{A2B89D22-ED90-2B1D-307C-60C3A5C0E1CE}"/>
               </a:ext>
             </a:extLst>
           </p:cNvPr>
@@ -6192,41 +6283,6 @@
         </p:nvPicPr>
         <p:blipFill>
           <a:blip r:embed="rId13">
-            <a:extLst>
-              <a:ext uri="{28A0092B-C50C-407E-A947-70E740481C1C}">
-                <a14:useLocalDpi xmlns:a14="http://schemas.microsoft.com/office/drawing/2010/main" val="0"/>
-              </a:ext>
-            </a:extLst>
-          </a:blip>
-          <a:srcRect t="11292"/>
-          <a:stretch/>
-        </p:blipFill>
-        <p:spPr>
-          <a:xfrm>
-            <a:off x="10921154" y="5935363"/>
-            <a:ext cx="8974573" cy="5970819"/>
-          </a:xfrm>
-          <a:prstGeom prst="rect">
-            <a:avLst/>
-          </a:prstGeom>
-        </p:spPr>
-      </p:pic>
-      <p:pic>
-        <p:nvPicPr>
-          <p:cNvPr id="54" name="Picture 53" descr="A diagram of a variety of species&#10;&#10;Description automatically generated with medium confidence">
-            <a:extLst>
-              <a:ext uri="{FF2B5EF4-FFF2-40B4-BE49-F238E27FC236}">
-                <a16:creationId xmlns:a16="http://schemas.microsoft.com/office/drawing/2014/main" id="{A2B89D22-ED90-2B1D-307C-60C3A5C0E1CE}"/>
-              </a:ext>
-            </a:extLst>
-          </p:cNvPr>
-          <p:cNvPicPr>
-            <a:picLocks noChangeAspect="1"/>
-          </p:cNvPicPr>
-          <p:nvPr/>
-        </p:nvPicPr>
-        <p:blipFill>
-          <a:blip r:embed="rId14">
             <a:extLst>
               <a:ext uri="{28A0092B-C50C-407E-A947-70E740481C1C}">
                 <a14:useLocalDpi xmlns:a14="http://schemas.microsoft.com/office/drawing/2010/main" val="0"/>
@@ -6239,7 +6295,7 @@
         </p:blipFill>
         <p:spPr>
           <a:xfrm>
-            <a:off x="21829072" y="21854630"/>
+            <a:off x="22175219" y="20435574"/>
             <a:ext cx="10489479" cy="7867109"/>
           </a:xfrm>
           <a:prstGeom prst="rect">
@@ -6648,8 +6704,8 @@
         </p:nvSpPr>
         <p:spPr>
           <a:xfrm>
-            <a:off x="22720337" y="29636400"/>
-            <a:ext cx="9244749" cy="830997"/>
+            <a:off x="21731213" y="28150388"/>
+            <a:ext cx="11126278" cy="3046988"/>
           </a:xfrm>
           <a:prstGeom prst="rect">
             <a:avLst/>
@@ -6664,11 +6720,11 @@
           <a:p>
             <a:r>
               <a:rPr lang="en-US" sz="2400" b="1" dirty="0"/>
-              <a:t>Figure 3. </a:t>
+              <a:t>Variation in community composition across sites. </a:t>
             </a:r>
             <a:r>
               <a:rPr lang="en-US" sz="2400" dirty="0"/>
-              <a:t>Multivariate analysis of species communities comparing results from all 3 study sites.</a:t>
+              <a:t>Bee species are plotted on the first two axes of a three-dimensional non-metric multidimensional scaling ordination of the 58 combinations of station (subsite) and year, across the three sites. Small points are the individual station/year combinations. Large points are the centroids of the three sites. Ellipses are 95% confidence intervals around the site centroids. Bee species shown are the most representative (top 10th percentile of a random forest analysis) of the compositional differences among sites. Text size of the labels is proportional to variable importance score (mean decrease in Gini score).</a:t>
             </a:r>
           </a:p>
         </p:txBody>
@@ -6865,12 +6921,12 @@
           <a:graphicData uri="http://schemas.openxmlformats.org/presentationml/2006/ole">
             <mc:AlternateContent xmlns:mc="http://schemas.openxmlformats.org/markup-compatibility/2006">
               <mc:Choice xmlns:v="urn:schemas-microsoft-com:vml" Requires="v">
-                <p:oleObj name="Worksheet" r:id="rId15" imgW="6934200" imgH="4368800" progId="Excel.Sheet.12">
+                <p:oleObj name="Worksheet" r:id="rId14" imgW="6934200" imgH="4368800" progId="Excel.Sheet.12">
                   <p:embed/>
                 </p:oleObj>
               </mc:Choice>
               <mc:Fallback>
-                <p:oleObj name="Worksheet" r:id="rId15" imgW="6934200" imgH="4368800" progId="Excel.Sheet.12">
+                <p:oleObj name="Worksheet" r:id="rId14" imgW="6934200" imgH="4368800" progId="Excel.Sheet.12">
                   <p:embed/>
                   <p:pic>
                     <p:nvPicPr>
@@ -6879,7 +6935,7 @@
                       <p:nvPr/>
                     </p:nvPicPr>
                     <p:blipFill>
-                      <a:blip r:embed="rId16"/>
+                      <a:blip r:embed="rId15"/>
                       <a:stretch>
                         <a:fillRect/>
                       </a:stretch>
@@ -6921,7 +6977,7 @@
         </p:blipFill>
         <p:spPr>
           <a:xfrm>
-            <a:off x="10548315" y="20067481"/>
+            <a:off x="10488910" y="20374301"/>
             <a:ext cx="9720255" cy="9365159"/>
           </a:xfrm>
           <a:prstGeom prst="rect">
@@ -6948,8 +7004,8 @@
         </p:nvSpPr>
         <p:spPr>
           <a:xfrm>
-            <a:off x="10921154" y="11906182"/>
-            <a:ext cx="8974573" cy="1877214"/>
+            <a:off x="10461655" y="12072283"/>
+            <a:ext cx="9820249" cy="1793988"/>
           </a:xfrm>
           <a:prstGeom prst="rect">
             <a:avLst/>
@@ -6986,6 +7042,42 @@
           </a:p>
         </p:txBody>
       </p:sp>
+      <p:pic>
+        <p:nvPicPr>
+          <p:cNvPr id="59" name="Picture 58" descr="A graph of a number of years&#10;&#10;Description automatically generated with medium confidence">
+            <a:extLst>
+              <a:ext uri="{FF2B5EF4-FFF2-40B4-BE49-F238E27FC236}">
+                <a16:creationId xmlns:a16="http://schemas.microsoft.com/office/drawing/2014/main" id="{1BAAF649-09C0-1EDD-B68C-8AB05838204D}"/>
+              </a:ext>
+            </a:extLst>
+          </p:cNvPr>
+          <p:cNvPicPr>
+            <a:picLocks noChangeAspect="1"/>
+          </p:cNvPicPr>
+          <p:nvPr/>
+        </p:nvPicPr>
+        <p:blipFill>
+          <a:blip r:embed="rId16">
+            <a:extLst>
+              <a:ext uri="{28A0092B-C50C-407E-A947-70E740481C1C}">
+                <a14:useLocalDpi xmlns:a14="http://schemas.microsoft.com/office/drawing/2010/main" val="0"/>
+              </a:ext>
+            </a:extLst>
+          </a:blip>
+          <a:stretch>
+            <a:fillRect/>
+          </a:stretch>
+        </p:blipFill>
+        <p:spPr>
+          <a:xfrm>
+            <a:off x="10461655" y="5799271"/>
+            <a:ext cx="9820250" cy="6273011"/>
+          </a:xfrm>
+          <a:prstGeom prst="rect">
+            <a:avLst/>
+          </a:prstGeom>
+        </p:spPr>
+      </p:pic>
       <p:sp>
         <p:nvSpPr>
           <p:cNvPr id="56" name="TextBox 55">
@@ -7000,8 +7092,8 @@
         </p:nvSpPr>
         <p:spPr>
           <a:xfrm>
-            <a:off x="12019940" y="12358242"/>
-            <a:ext cx="7193912" cy="830997"/>
+            <a:off x="10548314" y="11871663"/>
+            <a:ext cx="9660849" cy="1938992"/>
           </a:xfrm>
           <a:prstGeom prst="rect">
             <a:avLst/>
@@ -7015,9 +7107,224 @@
           <a:lstStyle/>
           <a:p>
             <a:r>
+              <a:rPr lang="en-US" sz="2400" b="1" dirty="0"/>
+              <a:t>Species richness across sites and sampling years.</a:t>
+            </a:r>
+            <a:r>
               <a:rPr lang="en-US" sz="2400" dirty="0"/>
-              <a:t>Aggregate species accumulation curve across the 6-year sampling period. b) Same for SCL, c) POS, and d) BPF.</a:t>
-            </a:r>
+              <a:t> Points are Chao1 minimum estimated species richness, triangles are raw species counts at each substation within each site. Chao richness estimates are lifted by an additive parameter that accounts for rare species likely missed in the sampling. The data exclude some morphospecies, and all net caught records.</a:t>
+            </a:r>
+          </a:p>
+        </p:txBody>
+      </p:sp>
+      <p:sp>
+        <p:nvSpPr>
+          <p:cNvPr id="61" name="Rectangle 60">
+            <a:extLst>
+              <a:ext uri="{FF2B5EF4-FFF2-40B4-BE49-F238E27FC236}">
+                <a16:creationId xmlns:a16="http://schemas.microsoft.com/office/drawing/2014/main" id="{C1E64BDE-CC3B-6305-7B5D-D933D8ECA8E1}"/>
+              </a:ext>
+            </a:extLst>
+          </p:cNvPr>
+          <p:cNvSpPr/>
+          <p:nvPr/>
+        </p:nvSpPr>
+        <p:spPr>
+          <a:xfrm>
+            <a:off x="10461655" y="29468175"/>
+            <a:ext cx="9747510" cy="1933443"/>
+          </a:xfrm>
+          <a:prstGeom prst="rect">
+            <a:avLst/>
+          </a:prstGeom>
+          <a:solidFill>
+            <a:srgbClr val="FFFFFF"/>
+          </a:solidFill>
+          <a:ln>
+            <a:noFill/>
+          </a:ln>
+        </p:spPr>
+        <p:style>
+          <a:lnRef idx="2">
+            <a:schemeClr val="accent1">
+              <a:shade val="50000"/>
+            </a:schemeClr>
+          </a:lnRef>
+          <a:fillRef idx="1">
+            <a:schemeClr val="accent1"/>
+          </a:fillRef>
+          <a:effectRef idx="0">
+            <a:schemeClr val="accent1"/>
+          </a:effectRef>
+          <a:fontRef idx="minor">
+            <a:schemeClr val="lt1"/>
+          </a:fontRef>
+        </p:style>
+        <p:txBody>
+          <a:bodyPr rtlCol="0" anchor="ctr"/>
+          <a:lstStyle/>
+          <a:p>
+            <a:pPr algn="ctr"/>
+            <a:endParaRPr lang="en-US" dirty="0"/>
+          </a:p>
+        </p:txBody>
+      </p:sp>
+      <p:sp>
+        <p:nvSpPr>
+          <p:cNvPr id="62" name="Rectangle 61">
+            <a:extLst>
+              <a:ext uri="{FF2B5EF4-FFF2-40B4-BE49-F238E27FC236}">
+                <a16:creationId xmlns:a16="http://schemas.microsoft.com/office/drawing/2014/main" id="{346BA3BA-9C08-E69F-BA28-BB7847B01015}"/>
+              </a:ext>
+            </a:extLst>
+          </p:cNvPr>
+          <p:cNvSpPr/>
+          <p:nvPr/>
+        </p:nvSpPr>
+        <p:spPr>
+          <a:xfrm>
+            <a:off x="10749472" y="30202929"/>
+            <a:ext cx="9009911" cy="1113298"/>
+          </a:xfrm>
+          <a:prstGeom prst="rect">
+            <a:avLst/>
+          </a:prstGeom>
+          <a:solidFill>
+            <a:schemeClr val="bg1"/>
+          </a:solidFill>
+          <a:ln>
+            <a:noFill/>
+          </a:ln>
+        </p:spPr>
+        <p:style>
+          <a:lnRef idx="2">
+            <a:schemeClr val="accent1">
+              <a:shade val="50000"/>
+            </a:schemeClr>
+          </a:lnRef>
+          <a:fillRef idx="1">
+            <a:schemeClr val="accent1"/>
+          </a:fillRef>
+          <a:effectRef idx="0">
+            <a:schemeClr val="accent1"/>
+          </a:effectRef>
+          <a:fontRef idx="minor">
+            <a:schemeClr val="lt1"/>
+          </a:fontRef>
+        </p:style>
+        <p:txBody>
+          <a:bodyPr rtlCol="0" anchor="ctr"/>
+          <a:lstStyle/>
+          <a:p>
+            <a:pPr marL="457200" indent="-457200" algn="just">
+              <a:buFont typeface="Arial" panose="020B0604020202020204" pitchFamily="34" charset="0"/>
+              <a:buChar char="•"/>
+            </a:pPr>
+            <a:r>
+              <a:rPr lang="en-US" sz="2400" dirty="0">
+                <a:solidFill>
+                  <a:schemeClr val="tx1"/>
+                </a:solidFill>
+              </a:rPr>
+              <a:t>BPF = Boeing Paine Field (8 stations).</a:t>
+            </a:r>
+          </a:p>
+          <a:p>
+            <a:pPr marL="457200" indent="-457200" algn="just">
+              <a:buFont typeface="Arial" panose="020B0604020202020204" pitchFamily="34" charset="0"/>
+              <a:buChar char="•"/>
+            </a:pPr>
+            <a:r>
+              <a:rPr lang="en-US" sz="2400" dirty="0">
+                <a:solidFill>
+                  <a:schemeClr val="tx1"/>
+                </a:solidFill>
+              </a:rPr>
+              <a:t>POS = Port of Seattle (SeaTac Airport) (22 stations).</a:t>
+            </a:r>
+          </a:p>
+          <a:p>
+            <a:pPr marL="457200" indent="-457200" algn="just">
+              <a:buFont typeface="Arial" panose="020B0604020202020204" pitchFamily="34" charset="0"/>
+              <a:buChar char="•"/>
+            </a:pPr>
+            <a:r>
+              <a:rPr lang="en-US" sz="2400" dirty="0">
+                <a:solidFill>
+                  <a:schemeClr val="tx1"/>
+                </a:solidFill>
+              </a:rPr>
+              <a:t>SCL = Seattle City Light power corridor (5 stations).</a:t>
+            </a:r>
+            <a:endParaRPr lang="en-US" sz="2000" b="1" dirty="0">
+              <a:solidFill>
+                <a:schemeClr val="tx1"/>
+              </a:solidFill>
+            </a:endParaRPr>
+          </a:p>
+        </p:txBody>
+      </p:sp>
+      <p:sp>
+        <p:nvSpPr>
+          <p:cNvPr id="64" name="Rectangle 63">
+            <a:extLst>
+              <a:ext uri="{FF2B5EF4-FFF2-40B4-BE49-F238E27FC236}">
+                <a16:creationId xmlns:a16="http://schemas.microsoft.com/office/drawing/2014/main" id="{CAD9AEB1-CC4B-8040-233F-08AD9DFE811B}"/>
+              </a:ext>
+            </a:extLst>
+          </p:cNvPr>
+          <p:cNvSpPr/>
+          <p:nvPr/>
+        </p:nvSpPr>
+        <p:spPr>
+          <a:xfrm>
+            <a:off x="10749472" y="29468175"/>
+            <a:ext cx="9009911" cy="629668"/>
+          </a:xfrm>
+          <a:prstGeom prst="rect">
+            <a:avLst/>
+          </a:prstGeom>
+          <a:solidFill>
+            <a:srgbClr val="FFFFFF"/>
+          </a:solidFill>
+          <a:ln>
+            <a:noFill/>
+          </a:ln>
+        </p:spPr>
+        <p:style>
+          <a:lnRef idx="2">
+            <a:schemeClr val="accent1">
+              <a:shade val="50000"/>
+            </a:schemeClr>
+          </a:lnRef>
+          <a:fillRef idx="1">
+            <a:schemeClr val="accent1"/>
+          </a:fillRef>
+          <a:effectRef idx="0">
+            <a:schemeClr val="accent1"/>
+          </a:effectRef>
+          <a:fontRef idx="minor">
+            <a:schemeClr val="lt1"/>
+          </a:fontRef>
+        </p:style>
+        <p:txBody>
+          <a:bodyPr rtlCol="0" anchor="ctr"/>
+          <a:lstStyle/>
+          <a:p>
+            <a:pPr algn="ctr"/>
+            <a:r>
+              <a:rPr lang="en-US" sz="4400" b="1" dirty="0">
+                <a:solidFill>
+                  <a:schemeClr val="tx1"/>
+                </a:solidFill>
+              </a:rPr>
+              <a:t>Study sites</a:t>
+            </a:r>
+            <a:endParaRPr lang="en-US" b="1" dirty="0">
+              <a:solidFill>
+                <a:schemeClr val="tx1"/>
+              </a:solidFill>
+            </a:endParaRPr>
           </a:p>
         </p:txBody>
       </p:sp>

</xml_diff>